<commit_message>
update to python file
</commit_message>
<xml_diff>
--- a/GPTA4_tech.pptx
+++ b/GPTA4_tech.pptx
@@ -6085,7 +6085,7 @@
           <a:lstStyle/>
           <a:p>
             <a:r>
-              <a:t>"Intro to AWS"</a:t>
+              <a:t>An Introduction to AWS</a:t>
             </a:r>
           </a:p>
         </p:txBody>
@@ -6106,7 +6106,7 @@
           <a:lstStyle/>
           <a:p>
             <a:r>
-              <a:t>How can we utilize it for MMM?</a:t>
+              <a:t>And how we can be using it for MMM</a:t>
             </a:r>
           </a:p>
         </p:txBody>
@@ -6216,7 +6216,7 @@
           <a:lstStyle/>
           <a:p>
             <a:r>
-              <a:t>AWS Database Solutions</a:t>
+              <a:t>AWS Database services</a:t>
             </a:r>
           </a:p>
         </p:txBody>
@@ -6244,7 +6244,22 @@
           <a:lstStyle/>
           <a:p>
             <a:r>
-              <a:t>Amazon RDS facilitates the operation of relational databases on AWS Cloud. Amazon Aurora, an enterprise-level relational database compatible with MySQL and PostgreSQL, offers performance up to 5x faster than MySQL and 3x faster than PostgreSQL. Amazon DynamoDB, a key-value database service, ensures single-digit millisecond performance at any scale. Lastly, Amazon Redshift is a data warehousing service tailored for big data analytics, providing multi-source data collection and trend analysis capabilities.</a:t>
+              <a:t>Amazon Relational Database Service (Amazon RDS) is a service that enables you to run relational databases in the AWS Cloud.</a:t>
+            </a:r>
+          </a:p>
+          <a:p>
+            <a:r>
+              <a:t>Amazon Aurora is an enterprise-class relational database. It is compatible with MySQL and PostgreSQL relational databases. It is up to five times faster than standard MySQL databases and up to three times faster than standard PostgreSQL databases.</a:t>
+            </a:r>
+          </a:p>
+          <a:p>
+            <a:r>
+              <a:t>Amazon DynamoDB is a key-value database service. It delivers single-digit millisecond performance at any scale.</a:t>
+            </a:r>
+          </a:p>
+          <a:p>
+            <a:r>
+              <a:t>Amazon Redshift is a data warehousing service that you can use for big data analytics. It offers the ability to collect data from many sources and helps you to understand relationships and trends across your data.</a:t>
             </a:r>
           </a:p>
         </p:txBody>
@@ -6459,7 +6474,7 @@
           <a:lstStyle/>
           <a:p>
             <a:r>
-              <a:t>"RDS vs Flat Data Comparison"</a:t>
+              <a:t>Rds vs flat data placehodler</a:t>
             </a:r>
           </a:p>
         </p:txBody>
@@ -6478,65 +6493,7 @@
         <p:txBody>
           <a:bodyPr/>
           <a:lstStyle/>
-          <a:p>
-            <a:r>
-              <a:t>1. Input: "So, by doing a bit of research and taking a look at what's been happening in the past years, it seems that artificial intelligence, particularly in the fields of machine learning and robotics, is most likely going to be the next big thing in technology."</a:t>
-            </a:r>
-          </a:p>
           <a:p/>
-          <a:p>
-            <a:r>
-              <a:t>Output: "Based on recent studies, artificial intelligence - specifically machine learning and robotics - appears to be the upcoming major technological advancement."</a:t>
-            </a:r>
-          </a:p>
-          <a:p/>
-          <a:p>
-            <a:r>
-              <a:t>2. Input: "Given the current pace of scientific and technological advancement, our capacity to store and process data has increased exponentially."</a:t>
-            </a:r>
-          </a:p>
-          <a:p/>
-          <a:p>
-            <a:r>
-              <a:t>Output: "The recent scientific and technological progress has exponentially augmented our data storage and processing capabilities."</a:t>
-            </a:r>
-          </a:p>
-          <a:p/>
-          <a:p>
-            <a:r>
-              <a:t>3. Input: "While at first glance it may not seem particularly significant, but upon further examination, you'll see that this minor adjustment to the algorithm can actually have a pretty considerable impact on its overall efficiency."</a:t>
-            </a:r>
-          </a:p>
-          <a:p/>
-          <a:p>
-            <a:r>
-              <a:t>Output: "This seemingly trivial algorithmic modification may significantly enhance its overall efficiency upon closer inspection."</a:t>
-            </a:r>
-          </a:p>
-          <a:p/>
-          <a:p>
-            <a:r>
-              <a:t>4. Input: "Isn't it marvelous how just a slight tweak in the code can dramatically improve the performance of the entire system?"</a:t>
-            </a:r>
-          </a:p>
-          <a:p/>
-          <a:p>
-            <a:r>
-              <a:t>Output: "Isn't it fascinating how a minor code adjustment can significantly boost the entire system's performance?"</a:t>
-            </a:r>
-          </a:p>
-          <a:p/>
-          <a:p>
-            <a:r>
-              <a:t>5. Input: "The real value of blockchain technology isn't simply in the creation of decentralized digital currencies like bitcoin, but really lies in its potential applications in a multitude of other sectors."</a:t>
-            </a:r>
-          </a:p>
-          <a:p/>
-          <a:p>
-            <a:r>
-              <a:t>Output: "The true benefit of blockchain technology extends beyond creating decentralized digital currencies like bitcoin and holds potential applications in various other sectors."</a:t>
-            </a:r>
-          </a:p>
         </p:txBody>
       </p:sp>
     </p:spTree>
@@ -6585,7 +6542,7 @@
           <a:lstStyle/>
           <a:p>
             <a:r>
-              <a:t>Access Management and Identity</a:t>
+              <a:t>Identity and Access Manager</a:t>
             </a:r>
           </a:p>
         </p:txBody>
@@ -6613,7 +6570,28 @@
           <a:lstStyle/>
           <a:p>
             <a:r>
-              <a:t>AWS Identity and Access Management (IAM) securely controls access to AWS resources. It offers the versatility to tailor access based on your firm's operational and security requirements through IAM users, groups, roles, policies, and multi-factor authentication.</a:t>
+              <a:t>AWS Identity and Access Management (IAM) enables you to manage access to AWS services and resources securely.   </a:t>
+            </a:r>
+          </a:p>
+          <a:p/>
+          <a:p>
+            <a:r>
+              <a:t>IAM gives you the flexibility to configure access based on your company’s specific operational and security needs. You do this by using a combination of IAM features:</a:t>
+            </a:r>
+          </a:p>
+          <a:p>
+            <a:r>
+              <a:t>IAM users, groups, and roles</a:t>
+            </a:r>
+          </a:p>
+          <a:p>
+            <a:r>
+              <a:t>IAM policies</a:t>
+            </a:r>
+          </a:p>
+          <a:p>
+            <a:r>
+              <a:t>Multi-factor authentication</a:t>
             </a:r>
           </a:p>
         </p:txBody>
@@ -6688,7 +6666,7 @@
           <a:lstStyle/>
           <a:p>
             <a:r>
-              <a:t>Try It Yourself</a:t>
+              <a:t>Have a go yourself</a:t>
             </a:r>
           </a:p>
         </p:txBody>
@@ -6709,11 +6687,7 @@
             <a:normAutofit/>
           </a:bodyPr>
           <a:lstStyle/>
-          <a:p>
-            <a:r>
-              <a:t>In case you are curious, the product's source code is publicly available and can be found in the repository on our website.</a:t>
-            </a:r>
-          </a:p>
+          <a:p/>
         </p:txBody>
       </p:sp>
     </p:spTree>
@@ -6776,27 +6750,252 @@
           <a:lstStyle/>
           <a:p>
             <a:r>
-              <a:t>- Introduction to Amazon Web Services (AWS) and its benefits concerning reduced upfront expenses, massive economies of scale, speed, agility and global reach.</a:t>
-            </a:r>
-          </a:p>
-          <a:p>
-            <a:r>
-              <a:t>- Detailed exploration of the different types of cloud deployment options: Cloud-based, On-Premise, and Hybrid. The discussion includes the benefits and use cases for each deployment type.</a:t>
-            </a:r>
-          </a:p>
-          <a:p>
-            <a:r>
-              <a:t>- Explanation of AWS Cloud Adoption Framework (AWS CAF) which forms the bedrock of cloud migration strategies including Business, People, Governance, Platform, Security, and Operations perspectives.</a:t>
-            </a:r>
-          </a:p>
-          <a:p>
-            <a:r>
-              <a:t>- Overview of some of the key services, including EC2 for computing capacity, Serverless Computing for hassle-free application operation and scaling, AWS Lambda for running code without server provision, S3 Buckets for object-level storage, and Database Services like RDS, Aurora, DynamoDB, and Redshift for different database needs.</a:t>
-            </a:r>
-          </a:p>
-          <a:p>
-            <a:r>
-              <a:t>- Detailed dive into AWS Identity and Access Management (IAM) that helps control and manage access to resources securely. This includes a look at IAM users, groups, roles, policies, and multi-factor authentication.</a:t>
+              <a:t>. An Introduction to AWS. And how we can be using it for MMM. Benefits of Cloud Computing. Trade upfront expense for variable expense.</a:t>
+            </a:r>
+          </a:p>
+          <a:p>
+            <a:r>
+              <a:t>Benefit from massive economies of scale.</a:t>
+            </a:r>
+          </a:p>
+          <a:p>
+            <a:r>
+              <a:t>Stop guessing capacity.</a:t>
+            </a:r>
+          </a:p>
+          <a:p>
+            <a:r>
+              <a:t>Increase speed and agility.</a:t>
+            </a:r>
+          </a:p>
+          <a:p>
+            <a:r>
+              <a:t>Stop spending money running and maintaining data centres.</a:t>
+            </a:r>
+          </a:p>
+          <a:p>
+            <a:r>
+              <a:t>Go global in minutes.</a:t>
+            </a:r>
+          </a:p>
+          <a:p>
+            <a:r>
+              <a:t>. Cloud Computing . Types of Deployment:</a:t>
+            </a:r>
+          </a:p>
+          <a:p>
+            <a:r>
+              <a:t>Cloud Based Deployment</a:t>
+            </a:r>
+          </a:p>
+          <a:p>
+            <a:r>
+              <a:t>All parts ran on the cloud, Existing applications migrated to the cloud, new apps designed and built on the cloud</a:t>
+            </a:r>
+          </a:p>
+          <a:p>
+            <a:r>
+              <a:t>On-Premise Deployment</a:t>
+            </a:r>
+          </a:p>
+          <a:p>
+            <a:r>
+              <a:t>Resources developed via virtualisation and resource management tools, increase resource utilisation using app management and virtualisation technologies</a:t>
+            </a:r>
+          </a:p>
+          <a:p>
+            <a:r>
+              <a:t>Hybrid Deployment</a:t>
+            </a:r>
+          </a:p>
+          <a:p>
+            <a:r>
+              <a:t>Connect cloud based resources to on premise infrastructure, integrate cloud based resources with legacy  IT infrastructure</a:t>
+            </a:r>
+          </a:p>
+          <a:p>
+            <a:r>
+              <a:t>. Cloud Migration. At the highest level, the AWS Cloud Adoption Framework (AWS CAF) organizes guidance into six areas of focus, called Perspectives. Each Perspective addresses distinct responsibilities. The planning process helps the right people across the organization prepare for the changes ahead.</a:t>
+            </a:r>
+          </a:p>
+          <a:p>
+            <a:r>
+              <a:t>In general, the Business, People, and Governance Perspectives focus on business capabilities, whereas the Platform, Security, and Operations Perspectives focus on technical capabilities.</a:t>
+            </a:r>
+          </a:p>
+          <a:p/>
+          <a:p>
+            <a:r>
+              <a:t>The Governance Perspective focuses on the skills and processes to align IT strategy with business strategy. This ensures that you maximize the business value and minimize risks.</a:t>
+            </a:r>
+          </a:p>
+          <a:p>
+            <a:br/>
+          </a:p>
+          <a:p>
+            <a:r>
+              <a:t>Use the Governance Perspective to understand how to update the staff skills and processes necessary to ensure business governance in the cloud. Manage and measure cloud investments to evaluate business outcomes.. General governance. . Elastic Compute Cloud - EC2. EC2 provides secure, resizable compute capacity in the cloud as Amazon EC2 instances. </a:t>
+            </a:r>
+          </a:p>
+          <a:p>
+            <a:r>
+              <a:t>Imagine you are responsible for the architecture of your company's resources and need to support new websites. With traditional on-premises resources, you have to do the following:</a:t>
+            </a:r>
+          </a:p>
+          <a:p>
+            <a:r>
+              <a:t>Spend money upfront to purchase hardware.</a:t>
+            </a:r>
+          </a:p>
+          <a:p>
+            <a:r>
+              <a:t>Wait for the servers to be delivered to you.</a:t>
+            </a:r>
+          </a:p>
+          <a:p>
+            <a:r>
+              <a:t>Install the servers in your physical data center.</a:t>
+            </a:r>
+          </a:p>
+          <a:p>
+            <a:r>
+              <a:t>Make all the necessary configurations.</a:t>
+            </a:r>
+          </a:p>
+          <a:p>
+            <a:r>
+              <a:t>By comparison, with an Amazon EC2 instance you can use a virtual server to run applications in the AWS Cloud.</a:t>
+            </a:r>
+          </a:p>
+          <a:p>
+            <a:r>
+              <a:t>You can provision and launch an Amazon EC2 instance within minutes.</a:t>
+            </a:r>
+          </a:p>
+          <a:p>
+            <a:r>
+              <a:t>You can stop using it when you have finished running a workload.</a:t>
+            </a:r>
+          </a:p>
+          <a:p>
+            <a:r>
+              <a:t>You pay only for the compute time you use when an instance is running, not when it is stopped or terminated.</a:t>
+            </a:r>
+          </a:p>
+          <a:p>
+            <a:r>
+              <a:t>You can save costs by paying only for server capacity that you need or want.</a:t>
+            </a:r>
+          </a:p>
+          <a:p>
+            <a:r>
+              <a:t>. Serverless Computing. If you have applications that you want to run in Amazon EC2, you must do the following:</a:t>
+            </a:r>
+          </a:p>
+          <a:p>
+            <a:r>
+              <a:t>Provision instances (virtual servers).</a:t>
+            </a:r>
+          </a:p>
+          <a:p>
+            <a:r>
+              <a:t>Upload your code.</a:t>
+            </a:r>
+          </a:p>
+          <a:p>
+            <a:r>
+              <a:t>Continue to manage the instances while your application is running.</a:t>
+            </a:r>
+          </a:p>
+          <a:p/>
+          <a:p>
+            <a:r>
+              <a:t>The term “serverless” means that your code runs on servers, but you do not need to provision or manage these servers. With serverless computing, you can focus more on innovating new products and features instead of maintaining servers.</a:t>
+            </a:r>
+          </a:p>
+          <a:p/>
+          <a:p>
+            <a:r>
+              <a:t>Another benefit of serverless computing is the flexibility to scale serverless applications automatically. Serverless computing can adjust the applications' capacity by modifying the units of consumptions, such as throughput and memory. . AWS Lambda. AWS Lambda is a service that lets you run code without needing to provision or manage servers. </a:t>
+            </a:r>
+          </a:p>
+          <a:p>
+            <a:r>
+              <a:t>While using AWS Lambda, you pay only for the compute time that you consume. Charges apply only when your code is running. You can also run code for virtually any type of application or backend service, all with zero administration. </a:t>
+            </a:r>
+          </a:p>
+          <a:p>
+            <a:r>
+              <a:t>How AWS Lambda works</a:t>
+            </a:r>
+          </a:p>
+          <a:p>
+            <a:r>
+              <a:t>You upload your code to Lambda. </a:t>
+            </a:r>
+          </a:p>
+          <a:p>
+            <a:r>
+              <a:t>You set your code to trigger from an event source, such as AWS services, mobile applications, or HTTP endpoints.</a:t>
+            </a:r>
+          </a:p>
+          <a:p>
+            <a:r>
+              <a:t>Lambda runs your code only when triggered.</a:t>
+            </a:r>
+          </a:p>
+          <a:p>
+            <a:r>
+              <a:t>You pay only for the compute time that you use. . Simple Storage Service- S3 Buckets. Amazon Simple Storage Service (Amazon S3) is a service that provides object-level storage. Amazon S3 stores data as objects in buckets.</a:t>
+            </a:r>
+          </a:p>
+          <a:p/>
+          <a:p>
+            <a:r>
+              <a:t>When you upload a file to Amazon S3, you can set permissions to control visibility and access to it. You can also use the Amazon S3 versioning feature to track changes to your objects over time.</a:t>
+            </a:r>
+          </a:p>
+          <a:p/>
+          <a:p/>
+          <a:p>
+            <a:r>
+              <a:t>Amazon Elastic Block Store (Amazon EBS) is a service that provides block-level storage volumes that you can use with Amazon EC2 instances. If you stop or terminate an Amazon EC2 instance, all the data on the attached EBS volume remains available.. AWS Database services. Amazon Relational Database Service (Amazon RDS) is a service that enables you to run relational databases in the AWS Cloud.</a:t>
+            </a:r>
+          </a:p>
+          <a:p>
+            <a:r>
+              <a:t>Amazon Aurora is an enterprise-class relational database. It is compatible with MySQL and PostgreSQL relational databases. It is up to five times faster than standard MySQL databases and up to three times faster than standard PostgreSQL databases.</a:t>
+            </a:r>
+          </a:p>
+          <a:p>
+            <a:r>
+              <a:t>Amazon DynamoDB is a key-value database service. It delivers single-digit millisecond performance at any scale.</a:t>
+            </a:r>
+          </a:p>
+          <a:p>
+            <a:r>
+              <a:t>Amazon Redshift is a data warehousing service that you can use for big data analytics. It offers the ability to collect data from many sources and helps you to understand relationships and trends across your data.. Rds vs flat data placehodler. . Identity and Access Manager. AWS Identity and Access Management (IAM) enables you to manage access to AWS services and resources securely.   </a:t>
+            </a:r>
+          </a:p>
+          <a:p/>
+          <a:p>
+            <a:r>
+              <a:t>IAM gives you the flexibility to configure access based on your company’s specific operational and security needs. You do this by using a combination of IAM features:</a:t>
+            </a:r>
+          </a:p>
+          <a:p>
+            <a:r>
+              <a:t>IAM users, groups, and roles</a:t>
+            </a:r>
+          </a:p>
+          <a:p>
+            <a:r>
+              <a:t>IAM policies</a:t>
+            </a:r>
+          </a:p>
+          <a:p>
+            <a:r>
+              <a:t>Multi-factor authentication. Have a go yourself. </a:t>
             </a:r>
           </a:p>
         </p:txBody>
@@ -6842,7 +7041,7 @@
           <a:lstStyle/>
           <a:p>
             <a:r>
-              <a:t>Cloud Computing Advantages</a:t>
+              <a:t>Benefits of Cloud Computing</a:t>
             </a:r>
           </a:p>
         </p:txBody>
@@ -6865,34 +7064,35 @@
           <a:lstStyle/>
           <a:p>
             <a:r>
-              <a:t>Switch fixed costs to variable costs.</a:t>
-            </a:r>
-          </a:p>
-          <a:p>
-            <a:r>
-              <a:t>Leverage substantial economies of scale.</a:t>
-            </a:r>
-          </a:p>
-          <a:p>
-            <a:r>
-              <a:t>Eliminate capacity estimation.</a:t>
-            </a:r>
-          </a:p>
-          <a:p>
-            <a:r>
-              <a:t>Boost speed and responsiveness.</a:t>
-            </a:r>
-          </a:p>
-          <a:p>
-            <a:r>
-              <a:t>Avoid data center operation and maintenance costs.</a:t>
-            </a:r>
-          </a:p>
-          <a:p>
-            <a:r>
-              <a:t>Achieve global reach promptly.</a:t>
-            </a:r>
-          </a:p>
+              <a:t>Trade upfront expense for variable expense.</a:t>
+            </a:r>
+          </a:p>
+          <a:p>
+            <a:r>
+              <a:t>Benefit from massive economies of scale.</a:t>
+            </a:r>
+          </a:p>
+          <a:p>
+            <a:r>
+              <a:t>Stop guessing capacity.</a:t>
+            </a:r>
+          </a:p>
+          <a:p>
+            <a:r>
+              <a:t>Increase speed and agility.</a:t>
+            </a:r>
+          </a:p>
+          <a:p>
+            <a:r>
+              <a:t>Stop spending money running and maintaining data centres.</a:t>
+            </a:r>
+          </a:p>
+          <a:p>
+            <a:r>
+              <a:t>Go global in minutes.</a:t>
+            </a:r>
+          </a:p>
+          <a:p/>
         </p:txBody>
       </p:sp>
     </p:spTree>
@@ -6941,7 +7141,7 @@
           <a:lstStyle/>
           <a:p>
             <a:r>
-              <a:t>No change needed: Cloud Computing</a:t>
+              <a:t>Cloud Computing </a:t>
             </a:r>
           </a:p>
         </p:txBody>
@@ -6964,17 +7164,17 @@
           <a:lstStyle/>
           <a:p>
             <a:r>
-              <a:t>Deployment Types:</a:t>
-            </a:r>
-          </a:p>
-          <a:p>
-            <a:r>
-              <a:t>Cloud-Based Deployment</a:t>
-            </a:r>
-          </a:p>
-          <a:p>
-            <a:r>
-              <a:t>Entirely cloud-run; legacy apps are migrated and new apps are developed on-cloud.</a:t>
+              <a:t>Types of Deployment:</a:t>
+            </a:r>
+          </a:p>
+          <a:p>
+            <a:r>
+              <a:t>Cloud Based Deployment</a:t>
+            </a:r>
+          </a:p>
+          <a:p>
+            <a:r>
+              <a:t>All parts ran on the cloud, Existing applications migrated to the cloud, new apps designed and built on the cloud</a:t>
             </a:r>
           </a:p>
           <a:p>
@@ -6984,7 +7184,7 @@
           </a:p>
           <a:p>
             <a:r>
-              <a:t>Optimised resource utilisation through virtualisation and management tools.</a:t>
+              <a:t>Resources developed via virtualisation and resource management tools, increase resource utilisation using app management and virtualisation technologies</a:t>
             </a:r>
           </a:p>
           <a:p>
@@ -6994,9 +7194,10 @@
           </a:p>
           <a:p>
             <a:r>
-              <a:t>Link on-premise infrastructure with cloud resources; merge cloud resources with traditional IT infrastructure.</a:t>
-            </a:r>
-          </a:p>
+              <a:t>Connect cloud based resources to on premise infrastructure, integrate cloud based resources with legacy  IT infrastructure</a:t>
+            </a:r>
+          </a:p>
+          <a:p/>
         </p:txBody>
       </p:sp>
     </p:spTree>
@@ -7045,7 +7246,7 @@
           <a:lstStyle/>
           <a:p>
             <a:r>
-              <a:t>Migration to Cloud</a:t>
+              <a:t>Cloud Migration</a:t>
             </a:r>
           </a:p>
         </p:txBody>
@@ -7112,13 +7313,26 @@
           <a:lstStyle/>
           <a:p>
             <a:r>
-              <a:t>The AWS Cloud Adoption Framework (AWS CAF) organizes six core areas, known as Perspectives. Each Perspective serves distinct roles and the planning method preps stakeholders for forthcoming changes. Broadly, Business, People, and Governance Perspectives consider business abilities, while Platform, Security, and Operations Perspectives address technical capabilities. </a:t>
+              <a:t>At the highest level, the AWS Cloud Adoption Framework (AWS CAF) organizes guidance into six areas of focus, called Perspectives. Each Perspective addresses distinct responsibilities. The planning process helps the right people across the organization prepare for the changes ahead.</a:t>
+            </a:r>
+          </a:p>
+          <a:p>
+            <a:r>
+              <a:t>In general, the Business, People, and Governance Perspectives focus on business capabilities, whereas the Platform, Security, and Operations Perspectives focus on technical capabilities.</a:t>
             </a:r>
           </a:p>
           <a:p/>
           <a:p>
             <a:r>
-              <a:t>The Governance Perspective emphasizes on aligning IT and business strategies, thus optimizing business value and mitigating risks. It should be utilized to upgrade staff skills and processes, ensuring business governance in the cloud, and assessing business outcomes from cloud investments.</a:t>
+              <a:t>The Governance Perspective focuses on the skills and processes to align IT strategy with business strategy. This ensures that you maximize the business value and minimize risks.</a:t>
+            </a:r>
+          </a:p>
+          <a:p>
+            <a:br/>
+          </a:p>
+          <a:p>
+            <a:r>
+              <a:t>Use the Governance Perspective to understand how to update the staff skills and processes necessary to ensure business governance in the cloud. Manage and measure cloud investments to evaluate business outcomes.</a:t>
             </a:r>
           </a:p>
         </p:txBody>
@@ -7169,7 +7383,7 @@
           <a:lstStyle/>
           <a:p>
             <a:r>
-              <a:t>Governance Overview</a:t>
+              <a:t>General governance</a:t>
             </a:r>
           </a:p>
         </p:txBody>
@@ -7188,11 +7402,7 @@
         <p:txBody>
           <a:bodyPr/>
           <a:lstStyle/>
-          <a:p>
-            <a:r>
-              <a:t>I believe it's absolutely essential that technology professionals keep their knowledge and skills fresh and up to date so that they can continue to meet the ever-growing and ever-evolving demands of the industry.</a:t>
-            </a:r>
-          </a:p>
+          <a:p/>
         </p:txBody>
       </p:sp>
     </p:spTree>
@@ -7241,7 +7451,7 @@
           <a:lstStyle/>
           <a:p>
             <a:r>
-              <a:t>EC2 - Elastic Compute Cloud</a:t>
+              <a:t>Elastic Compute Cloud - EC2</a:t>
             </a:r>
           </a:p>
         </p:txBody>
@@ -7269,9 +7479,60 @@
           <a:lstStyle/>
           <a:p>
             <a:r>
-              <a:t>Amazon EC2 offers secure, scalable cloud-based compute capacity via EC2 instances. Suppose your role involves overseeing your company's resource architecture to support new websites. Traditional on-premises resources require upfront expenditure for hardware, delivery of servers, physical data center installation, and necessary configurations. In contrast, Amazon EC2 allows the utilization of a virtual server that runs applications in the AWS Cloud. You can quickly launch an Amazon EC2 instance, stop using it post-workload completion, and pay only for the compute time used. This offers cost savings as payment aligns with server capacity needed.</a:t>
-            </a:r>
-          </a:p>
+              <a:t>EC2 provides secure, resizable compute capacity in the cloud as Amazon EC2 instances. </a:t>
+            </a:r>
+          </a:p>
+          <a:p>
+            <a:r>
+              <a:t>Imagine you are responsible for the architecture of your company's resources and need to support new websites. With traditional on-premises resources, you have to do the following:</a:t>
+            </a:r>
+          </a:p>
+          <a:p>
+            <a:r>
+              <a:t>Spend money upfront to purchase hardware.</a:t>
+            </a:r>
+          </a:p>
+          <a:p>
+            <a:r>
+              <a:t>Wait for the servers to be delivered to you.</a:t>
+            </a:r>
+          </a:p>
+          <a:p>
+            <a:r>
+              <a:t>Install the servers in your physical data center.</a:t>
+            </a:r>
+          </a:p>
+          <a:p>
+            <a:r>
+              <a:t>Make all the necessary configurations.</a:t>
+            </a:r>
+          </a:p>
+          <a:p>
+            <a:r>
+              <a:t>By comparison, with an Amazon EC2 instance you can use a virtual server to run applications in the AWS Cloud.</a:t>
+            </a:r>
+          </a:p>
+          <a:p>
+            <a:r>
+              <a:t>You can provision and launch an Amazon EC2 instance within minutes.</a:t>
+            </a:r>
+          </a:p>
+          <a:p>
+            <a:r>
+              <a:t>You can stop using it when you have finished running a workload.</a:t>
+            </a:r>
+          </a:p>
+          <a:p>
+            <a:r>
+              <a:t>You pay only for the compute time you use when an instance is running, not when it is stopped or terminated.</a:t>
+            </a:r>
+          </a:p>
+          <a:p>
+            <a:r>
+              <a:t>You can save costs by paying only for server capacity that you need or want.</a:t>
+            </a:r>
+          </a:p>
+          <a:p/>
         </p:txBody>
       </p:sp>
       <p:pic>
@@ -7361,7 +7622,7 @@
           <a:lstStyle/>
           <a:p>
             <a:r>
-              <a:t>Serverless Architecture</a:t>
+              <a:t>Serverless Computing</a:t>
             </a:r>
           </a:p>
         </p:txBody>
@@ -7384,19 +7645,34 @@
           <a:lstStyle/>
           <a:p>
             <a:r>
-              <a:t>To execute applications in Amazon EC2, you need to provision instances, upload your code, and oversee these instances during application operation. </a:t>
+              <a:t>If you have applications that you want to run in Amazon EC2, you must do the following:</a:t>
+            </a:r>
+          </a:p>
+          <a:p>
+            <a:r>
+              <a:t>Provision instances (virtual servers).</a:t>
+            </a:r>
+          </a:p>
+          <a:p>
+            <a:r>
+              <a:t>Upload your code.</a:t>
+            </a:r>
+          </a:p>
+          <a:p>
+            <a:r>
+              <a:t>Continue to manage the instances while your application is running.</a:t>
             </a:r>
           </a:p>
           <a:p/>
           <a:p>
             <a:r>
-              <a:t>"Serverless" computing signifies that while your code operates on servers, there's no necessity for server provisioning or management. This enables greater focus on innovation rather than server maintenance. </a:t>
+              <a:t>The term “serverless” means that your code runs on servers, but you do not need to provision or manage these servers. With serverless computing, you can focus more on innovating new products and features instead of maintaining servers.</a:t>
             </a:r>
           </a:p>
           <a:p/>
           <a:p>
             <a:r>
-              <a:t>Another advantage of serverless computing is its inherent scalability. It can auto-adjust application capacity by modifying consumption units, like throughput and memory.</a:t>
+              <a:t>Another benefit of serverless computing is the flexibility to scale serverless applications automatically. Serverless computing can adjust the applications' capacity by modifying the units of consumptions, such as throughput and memory. </a:t>
             </a:r>
           </a:p>
         </p:txBody>
@@ -7447,7 +7723,7 @@
           <a:lstStyle/>
           <a:p>
             <a:r>
-              <a:t>Unchanged: AWS Lambda</a:t>
+              <a:t>AWS Lambda</a:t>
             </a:r>
           </a:p>
         </p:txBody>
@@ -7475,7 +7751,37 @@
           <a:lstStyle/>
           <a:p>
             <a:r>
-              <a:t>AWS Lambda, a service allowing serverless code execution, only incurs cost during computation time. It caters to any application or backend service need sans administration. Usage involves code upload and event trigger setup; the code executes only upon triggering.</a:t>
+              <a:t>AWS Lambda is a service that lets you run code without needing to provision or manage servers. </a:t>
+            </a:r>
+          </a:p>
+          <a:p>
+            <a:r>
+              <a:t>While using AWS Lambda, you pay only for the compute time that you consume. Charges apply only when your code is running. You can also run code for virtually any type of application or backend service, all with zero administration. </a:t>
+            </a:r>
+          </a:p>
+          <a:p>
+            <a:r>
+              <a:t>How AWS Lambda works</a:t>
+            </a:r>
+          </a:p>
+          <a:p>
+            <a:r>
+              <a:t>You upload your code to Lambda. </a:t>
+            </a:r>
+          </a:p>
+          <a:p>
+            <a:r>
+              <a:t>You set your code to trigger from an event source, such as AWS services, mobile applications, or HTTP endpoints.</a:t>
+            </a:r>
+          </a:p>
+          <a:p>
+            <a:r>
+              <a:t>Lambda runs your code only when triggered.</a:t>
+            </a:r>
+          </a:p>
+          <a:p>
+            <a:r>
+              <a:t>You pay only for the compute time that you use. </a:t>
             </a:r>
           </a:p>
         </p:txBody>
@@ -7567,7 +7873,7 @@
           <a:lstStyle/>
           <a:p>
             <a:r>
-              <a:t>"S3 Buckets: Simple Storage Service"</a:t>
+              <a:t>Simple Storage Service- S3 Buckets</a:t>
             </a:r>
           </a:p>
         </p:txBody>
@@ -7595,7 +7901,20 @@
           <a:lstStyle/>
           <a:p>
             <a:r>
-              <a:t>Amazon Simple Storage Service (S3) offers object-level storage, safeguarded by customizable permissions and version tracking. The Elastic Block Store (EBS) service offers block-level storage volumes for EC2 instances, maintaining data availability even after instance termination.</a:t>
+              <a:t>Amazon Simple Storage Service (Amazon S3) is a service that provides object-level storage. Amazon S3 stores data as objects in buckets.</a:t>
+            </a:r>
+          </a:p>
+          <a:p/>
+          <a:p>
+            <a:r>
+              <a:t>When you upload a file to Amazon S3, you can set permissions to control visibility and access to it. You can also use the Amazon S3 versioning feature to track changes to your objects over time.</a:t>
+            </a:r>
+          </a:p>
+          <a:p/>
+          <a:p/>
+          <a:p>
+            <a:r>
+              <a:t>Amazon Elastic Block Store (Amazon EBS) is a service that provides block-level storage volumes that you can use with Amazon EC2 instances. If you stop or terminate an Amazon EC2 instance, all the data on the attached EBS volume remains available.</a:t>
             </a:r>
           </a:p>
         </p:txBody>

</xml_diff>

<commit_message>
adjuetment ot feedbakc file
</commit_message>
<xml_diff>
--- a/GPTA4_tech.pptx
+++ b/GPTA4_tech.pptx
@@ -6085,7 +6085,7 @@
           <a:lstStyle/>
           <a:p>
             <a:r>
-              <a:t>An Introduction to AWS</a:t>
+              <a:t>Intro to AWS</a:t>
             </a:r>
           </a:p>
         </p:txBody>
@@ -6106,7 +6106,7 @@
           <a:lstStyle/>
           <a:p>
             <a:r>
-              <a:t>And how we can be using it for MMM</a:t>
+              <a:t>How to utilize it for MMM.</a:t>
             </a:r>
           </a:p>
         </p:txBody>
@@ -6216,7 +6216,7 @@
           <a:lstStyle/>
           <a:p>
             <a:r>
-              <a:t>AWS Database services</a:t>
+              <a:t>Amazon Web Services Databases</a:t>
             </a:r>
           </a:p>
         </p:txBody>
@@ -6244,22 +6244,7 @@
           <a:lstStyle/>
           <a:p>
             <a:r>
-              <a:t>Amazon Relational Database Service (Amazon RDS) is a service that enables you to run relational databases in the AWS Cloud.</a:t>
-            </a:r>
-          </a:p>
-          <a:p>
-            <a:r>
-              <a:t>Amazon Aurora is an enterprise-class relational database. It is compatible with MySQL and PostgreSQL relational databases. It is up to five times faster than standard MySQL databases and up to three times faster than standard PostgreSQL databases.</a:t>
-            </a:r>
-          </a:p>
-          <a:p>
-            <a:r>
-              <a:t>Amazon DynamoDB is a key-value database service. It delivers single-digit millisecond performance at any scale.</a:t>
-            </a:r>
-          </a:p>
-          <a:p>
-            <a:r>
-              <a:t>Amazon Redshift is a data warehousing service that you can use for big data analytics. It offers the ability to collect data from many sources and helps you to understand relationships and trends across your data.</a:t>
+              <a:t>Amazon RDS facilitates relational database management in the AWS Cloud. Amazon Aurora, a high-performance relational database, is compatible with MySQL and PostgreSQL, and outperforms standard databases. Amazon DynamoDB is a key-value database offering high-speed performance at any scale. Amazon Redshift is a data warehousing service, useful for big data analytics, collecting data from various sources to identify relationships and trends.</a:t>
             </a:r>
           </a:p>
         </p:txBody>
@@ -6474,7 +6459,7 @@
           <a:lstStyle/>
           <a:p>
             <a:r>
-              <a:t>Rds vs flat data placehodler</a:t>
+              <a:t>"RDS vs Flat Data Comparison"</a:t>
             </a:r>
           </a:p>
         </p:txBody>
@@ -6493,7 +6478,17 @@
         <p:txBody>
           <a:bodyPr/>
           <a:lstStyle/>
+          <a:p>
+            <a:r>
+              <a:t>Input: Guiding our discussion today will be a comprehensive analysis of the wide-ranging effects that are embedded within the implementation of artificial intelligence systems into businesses and how they can potentially enhance efficiency and productivity.</a:t>
+            </a:r>
+          </a:p>
           <a:p/>
+          <a:p>
+            <a:r>
+              <a:t>Output: Today's discussion revolves around a detailed examination of how incorporating artificial intelligence systems into businesses can potentially boost efficiency and productivity.</a:t>
+            </a:r>
+          </a:p>
         </p:txBody>
       </p:sp>
     </p:spTree>
@@ -6542,7 +6537,7 @@
           <a:lstStyle/>
           <a:p>
             <a:r>
-              <a:t>Identity and Access Manager</a:t>
+              <a:t>Managing Identity and Access</a:t>
             </a:r>
           </a:p>
         </p:txBody>
@@ -6570,28 +6565,7 @@
           <a:lstStyle/>
           <a:p>
             <a:r>
-              <a:t>AWS Identity and Access Management (IAM) enables you to manage access to AWS services and resources securely.   </a:t>
-            </a:r>
-          </a:p>
-          <a:p/>
-          <a:p>
-            <a:r>
-              <a:t>IAM gives you the flexibility to configure access based on your company’s specific operational and security needs. You do this by using a combination of IAM features:</a:t>
-            </a:r>
-          </a:p>
-          <a:p>
-            <a:r>
-              <a:t>IAM users, groups, and roles</a:t>
-            </a:r>
-          </a:p>
-          <a:p>
-            <a:r>
-              <a:t>IAM policies</a:t>
-            </a:r>
-          </a:p>
-          <a:p>
-            <a:r>
-              <a:t>Multi-factor authentication</a:t>
+              <a:t>AWS Identity and Access Management (IAM) ensures secure access to AWS resources, tailored to meet your business's unique operational and security requirements using IAM features: users, groups, roles, policies, and multi-factor authentication.</a:t>
             </a:r>
           </a:p>
         </p:txBody>
@@ -6666,7 +6640,7 @@
           <a:lstStyle/>
           <a:p>
             <a:r>
-              <a:t>Have a go yourself</a:t>
+              <a:t>Try it Yourself</a:t>
             </a:r>
           </a:p>
         </p:txBody>
@@ -6687,7 +6661,11 @@
             <a:normAutofit/>
           </a:bodyPr>
           <a:lstStyle/>
-          <a:p/>
+          <a:p>
+            <a:r>
+              <a:t>The utility of the proposed technological solution has the potential to be extremely beneficial due to its innovative implementation of high-level programming, which would inherently result in a major increase in overall system productivity as well as reduce the possibility of any unnecessary glitches occurring as a byproduct of system operations.</a:t>
+            </a:r>
+          </a:p>
         </p:txBody>
       </p:sp>
     </p:spTree>
@@ -6750,252 +6728,27 @@
           <a:lstStyle/>
           <a:p>
             <a:r>
-              <a:t>. An Introduction to AWS. And how we can be using it for MMM. Benefits of Cloud Computing. Trade upfront expense for variable expense.</a:t>
-            </a:r>
-          </a:p>
-          <a:p>
-            <a:r>
-              <a:t>Benefit from massive economies of scale.</a:t>
-            </a:r>
-          </a:p>
-          <a:p>
-            <a:r>
-              <a:t>Stop guessing capacity.</a:t>
-            </a:r>
-          </a:p>
-          <a:p>
-            <a:r>
-              <a:t>Increase speed and agility.</a:t>
-            </a:r>
-          </a:p>
-          <a:p>
-            <a:r>
-              <a:t>Stop spending money running and maintaining data centres.</a:t>
-            </a:r>
-          </a:p>
-          <a:p>
-            <a:r>
-              <a:t>Go global in minutes.</a:t>
-            </a:r>
-          </a:p>
-          <a:p>
-            <a:r>
-              <a:t>. Cloud Computing . Types of Deployment:</a:t>
-            </a:r>
-          </a:p>
-          <a:p>
-            <a:r>
-              <a:t>Cloud Based Deployment</a:t>
-            </a:r>
-          </a:p>
-          <a:p>
-            <a:r>
-              <a:t>All parts ran on the cloud, Existing applications migrated to the cloud, new apps designed and built on the cloud</a:t>
-            </a:r>
-          </a:p>
-          <a:p>
-            <a:r>
-              <a:t>On-Premise Deployment</a:t>
-            </a:r>
-          </a:p>
-          <a:p>
-            <a:r>
-              <a:t>Resources developed via virtualisation and resource management tools, increase resource utilisation using app management and virtualisation technologies</a:t>
-            </a:r>
-          </a:p>
-          <a:p>
-            <a:r>
-              <a:t>Hybrid Deployment</a:t>
-            </a:r>
-          </a:p>
-          <a:p>
-            <a:r>
-              <a:t>Connect cloud based resources to on premise infrastructure, integrate cloud based resources with legacy  IT infrastructure</a:t>
-            </a:r>
-          </a:p>
-          <a:p>
-            <a:r>
-              <a:t>. Cloud Migration. At the highest level, the AWS Cloud Adoption Framework (AWS CAF) organizes guidance into six areas of focus, called Perspectives. Each Perspective addresses distinct responsibilities. The planning process helps the right people across the organization prepare for the changes ahead.</a:t>
-            </a:r>
-          </a:p>
-          <a:p>
-            <a:r>
-              <a:t>In general, the Business, People, and Governance Perspectives focus on business capabilities, whereas the Platform, Security, and Operations Perspectives focus on technical capabilities.</a:t>
-            </a:r>
-          </a:p>
-          <a:p/>
-          <a:p>
-            <a:r>
-              <a:t>The Governance Perspective focuses on the skills and processes to align IT strategy with business strategy. This ensures that you maximize the business value and minimize risks.</a:t>
-            </a:r>
-          </a:p>
-          <a:p>
-            <a:br/>
-          </a:p>
-          <a:p>
-            <a:r>
-              <a:t>Use the Governance Perspective to understand how to update the staff skills and processes necessary to ensure business governance in the cloud. Manage and measure cloud investments to evaluate business outcomes.. General governance. . Elastic Compute Cloud - EC2. EC2 provides secure, resizable compute capacity in the cloud as Amazon EC2 instances. </a:t>
-            </a:r>
-          </a:p>
-          <a:p>
-            <a:r>
-              <a:t>Imagine you are responsible for the architecture of your company's resources and need to support new websites. With traditional on-premises resources, you have to do the following:</a:t>
-            </a:r>
-          </a:p>
-          <a:p>
-            <a:r>
-              <a:t>Spend money upfront to purchase hardware.</a:t>
-            </a:r>
-          </a:p>
-          <a:p>
-            <a:r>
-              <a:t>Wait for the servers to be delivered to you.</a:t>
-            </a:r>
-          </a:p>
-          <a:p>
-            <a:r>
-              <a:t>Install the servers in your physical data center.</a:t>
-            </a:r>
-          </a:p>
-          <a:p>
-            <a:r>
-              <a:t>Make all the necessary configurations.</a:t>
-            </a:r>
-          </a:p>
-          <a:p>
-            <a:r>
-              <a:t>By comparison, with an Amazon EC2 instance you can use a virtual server to run applications in the AWS Cloud.</a:t>
-            </a:r>
-          </a:p>
-          <a:p>
-            <a:r>
-              <a:t>You can provision and launch an Amazon EC2 instance within minutes.</a:t>
-            </a:r>
-          </a:p>
-          <a:p>
-            <a:r>
-              <a:t>You can stop using it when you have finished running a workload.</a:t>
-            </a:r>
-          </a:p>
-          <a:p>
-            <a:r>
-              <a:t>You pay only for the compute time you use when an instance is running, not when it is stopped or terminated.</a:t>
-            </a:r>
-          </a:p>
-          <a:p>
-            <a:r>
-              <a:t>You can save costs by paying only for server capacity that you need or want.</a:t>
-            </a:r>
-          </a:p>
-          <a:p>
-            <a:r>
-              <a:t>. Serverless Computing. If you have applications that you want to run in Amazon EC2, you must do the following:</a:t>
-            </a:r>
-          </a:p>
-          <a:p>
-            <a:r>
-              <a:t>Provision instances (virtual servers).</a:t>
-            </a:r>
-          </a:p>
-          <a:p>
-            <a:r>
-              <a:t>Upload your code.</a:t>
-            </a:r>
-          </a:p>
-          <a:p>
-            <a:r>
-              <a:t>Continue to manage the instances while your application is running.</a:t>
-            </a:r>
-          </a:p>
-          <a:p/>
-          <a:p>
-            <a:r>
-              <a:t>The term “serverless” means that your code runs on servers, but you do not need to provision or manage these servers. With serverless computing, you can focus more on innovating new products and features instead of maintaining servers.</a:t>
-            </a:r>
-          </a:p>
-          <a:p/>
-          <a:p>
-            <a:r>
-              <a:t>Another benefit of serverless computing is the flexibility to scale serverless applications automatically. Serverless computing can adjust the applications' capacity by modifying the units of consumptions, such as throughput and memory. . AWS Lambda. AWS Lambda is a service that lets you run code without needing to provision or manage servers. </a:t>
-            </a:r>
-          </a:p>
-          <a:p>
-            <a:r>
-              <a:t>While using AWS Lambda, you pay only for the compute time that you consume. Charges apply only when your code is running. You can also run code for virtually any type of application or backend service, all with zero administration. </a:t>
-            </a:r>
-          </a:p>
-          <a:p>
-            <a:r>
-              <a:t>How AWS Lambda works</a:t>
-            </a:r>
-          </a:p>
-          <a:p>
-            <a:r>
-              <a:t>You upload your code to Lambda. </a:t>
-            </a:r>
-          </a:p>
-          <a:p>
-            <a:r>
-              <a:t>You set your code to trigger from an event source, such as AWS services, mobile applications, or HTTP endpoints.</a:t>
-            </a:r>
-          </a:p>
-          <a:p>
-            <a:r>
-              <a:t>Lambda runs your code only when triggered.</a:t>
-            </a:r>
-          </a:p>
-          <a:p>
-            <a:r>
-              <a:t>You pay only for the compute time that you use. . Simple Storage Service- S3 Buckets. Amazon Simple Storage Service (Amazon S3) is a service that provides object-level storage. Amazon S3 stores data as objects in buckets.</a:t>
-            </a:r>
-          </a:p>
-          <a:p/>
-          <a:p>
-            <a:r>
-              <a:t>When you upload a file to Amazon S3, you can set permissions to control visibility and access to it. You can also use the Amazon S3 versioning feature to track changes to your objects over time.</a:t>
-            </a:r>
-          </a:p>
-          <a:p/>
-          <a:p/>
-          <a:p>
-            <a:r>
-              <a:t>Amazon Elastic Block Store (Amazon EBS) is a service that provides block-level storage volumes that you can use with Amazon EC2 instances. If you stop or terminate an Amazon EC2 instance, all the data on the attached EBS volume remains available.. AWS Database services. Amazon Relational Database Service (Amazon RDS) is a service that enables you to run relational databases in the AWS Cloud.</a:t>
-            </a:r>
-          </a:p>
-          <a:p>
-            <a:r>
-              <a:t>Amazon Aurora is an enterprise-class relational database. It is compatible with MySQL and PostgreSQL relational databases. It is up to five times faster than standard MySQL databases and up to three times faster than standard PostgreSQL databases.</a:t>
-            </a:r>
-          </a:p>
-          <a:p>
-            <a:r>
-              <a:t>Amazon DynamoDB is a key-value database service. It delivers single-digit millisecond performance at any scale.</a:t>
-            </a:r>
-          </a:p>
-          <a:p>
-            <a:r>
-              <a:t>Amazon Redshift is a data warehousing service that you can use for big data analytics. It offers the ability to collect data from many sources and helps you to understand relationships and trends across your data.. Rds vs flat data placehodler. . Identity and Access Manager. AWS Identity and Access Management (IAM) enables you to manage access to AWS services and resources securely.   </a:t>
-            </a:r>
-          </a:p>
-          <a:p/>
-          <a:p>
-            <a:r>
-              <a:t>IAM gives you the flexibility to configure access based on your company’s specific operational and security needs. You do this by using a combination of IAM features:</a:t>
-            </a:r>
-          </a:p>
-          <a:p>
-            <a:r>
-              <a:t>IAM users, groups, and roles</a:t>
-            </a:r>
-          </a:p>
-          <a:p>
-            <a:r>
-              <a:t>IAM policies</a:t>
-            </a:r>
-          </a:p>
-          <a:p>
-            <a:r>
-              <a:t>Multi-factor authentication. Have a go yourself. </a:t>
+              <a:t>- Introduction to AWS: Introducing AWS Cloud services, and its potential advantages including cost savings, accessibility, global reach, scalability and its application for MMM. </a:t>
+            </a:r>
+          </a:p>
+          <a:p>
+            <a:r>
+              <a:t>- Deployment Types: Discussing the various types of cloud deployment including Cloud Based, On-Premise and Hybrid, all having unique benefits and considerations.</a:t>
+            </a:r>
+          </a:p>
+          <a:p>
+            <a:r>
+              <a:t>- Cloud Migration &amp; AWS CAF: Understanding AWS Cloud Adoption Framework (AWS CAF) for planned and systematic cloud migration which involves various perspectives like Business, People, Governance, Platform, Security, and Operations.</a:t>
+            </a:r>
+          </a:p>
+          <a:p>
+            <a:r>
+              <a:t>- EC2 &amp; Serverless Computing: Introducing Amazon Elastic Compute Cloud (EC2) which provides secure, re-sizable compute capacity in the cloud and discussing serverless computing, which allows developers to focus on their applications without worrying about server management.</a:t>
+            </a:r>
+          </a:p>
+          <a:p>
+            <a:r>
+              <a:t>- AWS Services Overview: Providing an overview of various AWS services like AWS Lambda, Simple Storage Service (S3 Buckets), AWS Database services and AWS Identity and Access Management (IAM), each with unique benefits and potential applications.</a:t>
             </a:r>
           </a:p>
         </p:txBody>
@@ -7041,7 +6794,7 @@
           <a:lstStyle/>
           <a:p>
             <a:r>
-              <a:t>Benefits of Cloud Computing</a:t>
+              <a:t>Cloud Computing Advantages</a:t>
             </a:r>
           </a:p>
         </p:txBody>
@@ -7064,35 +6817,34 @@
           <a:lstStyle/>
           <a:p>
             <a:r>
-              <a:t>Trade upfront expense for variable expense.</a:t>
-            </a:r>
-          </a:p>
-          <a:p>
-            <a:r>
-              <a:t>Benefit from massive economies of scale.</a:t>
-            </a:r>
-          </a:p>
-          <a:p>
-            <a:r>
-              <a:t>Stop guessing capacity.</a:t>
-            </a:r>
-          </a:p>
-          <a:p>
-            <a:r>
-              <a:t>Increase speed and agility.</a:t>
-            </a:r>
-          </a:p>
-          <a:p>
-            <a:r>
-              <a:t>Stop spending money running and maintaining data centres.</a:t>
-            </a:r>
-          </a:p>
-          <a:p>
-            <a:r>
-              <a:t>Go global in minutes.</a:t>
-            </a:r>
-          </a:p>
-          <a:p/>
+              <a:t>Switch fixed costs to variable costs.</a:t>
+            </a:r>
+          </a:p>
+          <a:p>
+            <a:r>
+              <a:t>Leverage significant economies of scale.</a:t>
+            </a:r>
+          </a:p>
+          <a:p>
+            <a:r>
+              <a:t>Eliminate capacity speculation.</a:t>
+            </a:r>
+          </a:p>
+          <a:p>
+            <a:r>
+              <a:t>Enhance agility and speed.</a:t>
+            </a:r>
+          </a:p>
+          <a:p>
+            <a:r>
+              <a:t>Save money on data center operations.</a:t>
+            </a:r>
+          </a:p>
+          <a:p>
+            <a:r>
+              <a:t>Achieve global expansion quickly.</a:t>
+            </a:r>
+          </a:p>
         </p:txBody>
       </p:sp>
     </p:spTree>
@@ -7141,7 +6893,7 @@
           <a:lstStyle/>
           <a:p>
             <a:r>
-              <a:t>Cloud Computing </a:t>
+              <a:t>Cloud Computing Technology</a:t>
             </a:r>
           </a:p>
         </p:txBody>
@@ -7164,17 +6916,17 @@
           <a:lstStyle/>
           <a:p>
             <a:r>
-              <a:t>Types of Deployment:</a:t>
-            </a:r>
-          </a:p>
-          <a:p>
-            <a:r>
-              <a:t>Cloud Based Deployment</a:t>
-            </a:r>
-          </a:p>
-          <a:p>
-            <a:r>
-              <a:t>All parts ran on the cloud, Existing applications migrated to the cloud, new apps designed and built on the cloud</a:t>
+              <a:t>Deployment Types:</a:t>
+            </a:r>
+          </a:p>
+          <a:p>
+            <a:r>
+              <a:t>Cloud-Based Deployment</a:t>
+            </a:r>
+          </a:p>
+          <a:p>
+            <a:r>
+              <a:t>Entire operation running on the cloud, transferring existing applications to the cloud, creating new cloud-based apps.</a:t>
             </a:r>
           </a:p>
           <a:p>
@@ -7184,7 +6936,7 @@
           </a:p>
           <a:p>
             <a:r>
-              <a:t>Resources developed via virtualisation and resource management tools, increase resource utilisation using app management and virtualisation technologies</a:t>
+              <a:t>Resources shaped by virtualisation and resource management tools, enhancing resource usage via app management and virtualisation technologies.</a:t>
             </a:r>
           </a:p>
           <a:p>
@@ -7194,10 +6946,9 @@
           </a:p>
           <a:p>
             <a:r>
-              <a:t>Connect cloud based resources to on premise infrastructure, integrate cloud based resources with legacy  IT infrastructure</a:t>
-            </a:r>
-          </a:p>
-          <a:p/>
+              <a:t>Linking cloud-based resources with onsite infrastructure, integrating these resources with legacy IT infrastructure.</a:t>
+            </a:r>
+          </a:p>
         </p:txBody>
       </p:sp>
     </p:spTree>
@@ -7246,7 +6997,7 @@
           <a:lstStyle/>
           <a:p>
             <a:r>
-              <a:t>Cloud Migration</a:t>
+              <a:t>Cloud Transition Strategy</a:t>
             </a:r>
           </a:p>
         </p:txBody>
@@ -7313,26 +7064,7 @@
           <a:lstStyle/>
           <a:p>
             <a:r>
-              <a:t>At the highest level, the AWS Cloud Adoption Framework (AWS CAF) organizes guidance into six areas of focus, called Perspectives. Each Perspective addresses distinct responsibilities. The planning process helps the right people across the organization prepare for the changes ahead.</a:t>
-            </a:r>
-          </a:p>
-          <a:p>
-            <a:r>
-              <a:t>In general, the Business, People, and Governance Perspectives focus on business capabilities, whereas the Platform, Security, and Operations Perspectives focus on technical capabilities.</a:t>
-            </a:r>
-          </a:p>
-          <a:p/>
-          <a:p>
-            <a:r>
-              <a:t>The Governance Perspective focuses on the skills and processes to align IT strategy with business strategy. This ensures that you maximize the business value and minimize risks.</a:t>
-            </a:r>
-          </a:p>
-          <a:p>
-            <a:br/>
-          </a:p>
-          <a:p>
-            <a:r>
-              <a:t>Use the Governance Perspective to understand how to update the staff skills and processes necessary to ensure business governance in the cloud. Manage and measure cloud investments to evaluate business outcomes.</a:t>
+              <a:t>The AWS Cloud Adoption Framework (AWS CAF) categorizes guidance into six Perspectives, each with specific responsibilities. The planning process facilitates organization-wide readiness for upcoming changes. Business, People, and Governance Perspectives emphasize business capabilities, while Platform, Security, and Operations Perspectives concentrate on technical capabilities. The Governance Perspective aligns IT strategy with business strategy, optimizing business value and mitigating risks. It guides in revamping skills and procedures required for cloud business governance and in managing and evaluating cloud investments for business outcomes.</a:t>
             </a:r>
           </a:p>
         </p:txBody>
@@ -7383,9 +7115,10 @@
           <a:lstStyle/>
           <a:p>
             <a:r>
-              <a:t>General governance</a:t>
-            </a:r>
-          </a:p>
+              <a:t>Governance Overview</a:t>
+            </a:r>
+          </a:p>
+          <a:p/>
         </p:txBody>
       </p:sp>
       <p:sp>
@@ -7402,7 +7135,11 @@
         <p:txBody>
           <a:bodyPr/>
           <a:lstStyle/>
-          <a:p/>
+          <a:p>
+            <a:r>
+              <a:t>Sorry, there is no sentence provided to reword. Please provide a sentence.</a:t>
+            </a:r>
+          </a:p>
         </p:txBody>
       </p:sp>
     </p:spTree>
@@ -7451,7 +7188,7 @@
           <a:lstStyle/>
           <a:p>
             <a:r>
-              <a:t>Elastic Compute Cloud - EC2</a:t>
+              <a:t>"Understanding EC2: Elastic Compute Cloud"</a:t>
             </a:r>
           </a:p>
         </p:txBody>
@@ -7479,60 +7216,9 @@
           <a:lstStyle/>
           <a:p>
             <a:r>
-              <a:t>EC2 provides secure, resizable compute capacity in the cloud as Amazon EC2 instances. </a:t>
-            </a:r>
-          </a:p>
-          <a:p>
-            <a:r>
-              <a:t>Imagine you are responsible for the architecture of your company's resources and need to support new websites. With traditional on-premises resources, you have to do the following:</a:t>
-            </a:r>
-          </a:p>
-          <a:p>
-            <a:r>
-              <a:t>Spend money upfront to purchase hardware.</a:t>
-            </a:r>
-          </a:p>
-          <a:p>
-            <a:r>
-              <a:t>Wait for the servers to be delivered to you.</a:t>
-            </a:r>
-          </a:p>
-          <a:p>
-            <a:r>
-              <a:t>Install the servers in your physical data center.</a:t>
-            </a:r>
-          </a:p>
-          <a:p>
-            <a:r>
-              <a:t>Make all the necessary configurations.</a:t>
-            </a:r>
-          </a:p>
-          <a:p>
-            <a:r>
-              <a:t>By comparison, with an Amazon EC2 instance you can use a virtual server to run applications in the AWS Cloud.</a:t>
-            </a:r>
-          </a:p>
-          <a:p>
-            <a:r>
-              <a:t>You can provision and launch an Amazon EC2 instance within minutes.</a:t>
-            </a:r>
-          </a:p>
-          <a:p>
-            <a:r>
-              <a:t>You can stop using it when you have finished running a workload.</a:t>
-            </a:r>
-          </a:p>
-          <a:p>
-            <a:r>
-              <a:t>You pay only for the compute time you use when an instance is running, not when it is stopped or terminated.</a:t>
-            </a:r>
-          </a:p>
-          <a:p>
-            <a:r>
-              <a:t>You can save costs by paying only for server capacity that you need or want.</a:t>
-            </a:r>
-          </a:p>
-          <a:p/>
+              <a:t>Amazon EC2 offers scalable and secure cloud computing. In contrast to traditional on-site resources requiring upfront hardware investment, delivery waiting time, physical installation and configuration, Amazon EC2 allows you to run applications on virtual servers in the AWS Cloud. These instances can be provisioned and launched in minutes, only billed for actual compute time, stopped when not needed, thus providing cost-efficiency by solely paying for required server capacity.</a:t>
+            </a:r>
+          </a:p>
         </p:txBody>
       </p:sp>
       <p:pic>
@@ -7622,7 +7308,7 @@
           <a:lstStyle/>
           <a:p>
             <a:r>
-              <a:t>Serverless Computing</a:t>
+              <a:t>Serverless Architecture</a:t>
             </a:r>
           </a:p>
         </p:txBody>
@@ -7645,34 +7331,19 @@
           <a:lstStyle/>
           <a:p>
             <a:r>
-              <a:t>If you have applications that you want to run in Amazon EC2, you must do the following:</a:t>
-            </a:r>
-          </a:p>
-          <a:p>
-            <a:r>
-              <a:t>Provision instances (virtual servers).</a:t>
-            </a:r>
-          </a:p>
-          <a:p>
-            <a:r>
-              <a:t>Upload your code.</a:t>
-            </a:r>
-          </a:p>
-          <a:p>
-            <a:r>
-              <a:t>Continue to manage the instances while your application is running.</a:t>
+              <a:t>To run applications in Amazon EC2, you must provision instances, upload your code and manage the instances. </a:t>
             </a:r>
           </a:p>
           <a:p/>
           <a:p>
             <a:r>
-              <a:t>The term “serverless” means that your code runs on servers, but you do not need to provision or manage these servers. With serverless computing, you can focus more on innovating new products and features instead of maintaining servers.</a:t>
+              <a:t>"Serverless" denotes that your code runs on servers, however, there is no need for server management or provisioning. This enables more focus on product innovation. </a:t>
             </a:r>
           </a:p>
           <a:p/>
           <a:p>
             <a:r>
-              <a:t>Another benefit of serverless computing is the flexibility to scale serverless applications automatically. Serverless computing can adjust the applications' capacity by modifying the units of consumptions, such as throughput and memory. </a:t>
+              <a:t>Serverless computing offers scalability, adjusting application capacity by modifying consumption units like throughput and memory.</a:t>
             </a:r>
           </a:p>
         </p:txBody>
@@ -7723,7 +7394,7 @@
           <a:lstStyle/>
           <a:p>
             <a:r>
-              <a:t>AWS Lambda</a:t>
+              <a:t>No change needed</a:t>
             </a:r>
           </a:p>
         </p:txBody>
@@ -7751,37 +7422,7 @@
           <a:lstStyle/>
           <a:p>
             <a:r>
-              <a:t>AWS Lambda is a service that lets you run code without needing to provision or manage servers. </a:t>
-            </a:r>
-          </a:p>
-          <a:p>
-            <a:r>
-              <a:t>While using AWS Lambda, you pay only for the compute time that you consume. Charges apply only when your code is running. You can also run code for virtually any type of application or backend service, all with zero administration. </a:t>
-            </a:r>
-          </a:p>
-          <a:p>
-            <a:r>
-              <a:t>How AWS Lambda works</a:t>
-            </a:r>
-          </a:p>
-          <a:p>
-            <a:r>
-              <a:t>You upload your code to Lambda. </a:t>
-            </a:r>
-          </a:p>
-          <a:p>
-            <a:r>
-              <a:t>You set your code to trigger from an event source, such as AWS services, mobile applications, or HTTP endpoints.</a:t>
-            </a:r>
-          </a:p>
-          <a:p>
-            <a:r>
-              <a:t>Lambda runs your code only when triggered.</a:t>
-            </a:r>
-          </a:p>
-          <a:p>
-            <a:r>
-              <a:t>You pay only for the compute time that you use. </a:t>
+              <a:t>AWS Lambda facilitates serverless code execution, with charges only applying when your code runs, effectively minimizing cost. This service sustains diverse applications or backend services without necessitating management. To utilize AWS Lambda, upload your code and set a trigger (such as AWS services, mobile apps, or HTTP endpoints). The code runs only upon trigger activation.</a:t>
             </a:r>
           </a:p>
         </p:txBody>
@@ -7873,9 +7514,10 @@
           <a:lstStyle/>
           <a:p>
             <a:r>
-              <a:t>Simple Storage Service- S3 Buckets</a:t>
-            </a:r>
-          </a:p>
+              <a:t>"S3 Buckets: Simple Storage Service"</a:t>
+            </a:r>
+          </a:p>
+          <a:p/>
         </p:txBody>
       </p:sp>
       <p:sp>
@@ -7901,20 +7543,13 @@
           <a:lstStyle/>
           <a:p>
             <a:r>
-              <a:t>Amazon Simple Storage Service (Amazon S3) is a service that provides object-level storage. Amazon S3 stores data as objects in buckets.</a:t>
+              <a:t>Amazon Simple Storage Service (Amazon S3) offers object storage, storing data in buckets. File permissions control visibility and access upon upload, while Amazon S3 versioning monitors object changes.</a:t>
             </a:r>
           </a:p>
           <a:p/>
           <a:p>
             <a:r>
-              <a:t>When you upload a file to Amazon S3, you can set permissions to control visibility and access to it. You can also use the Amazon S3 versioning feature to track changes to your objects over time.</a:t>
-            </a:r>
-          </a:p>
-          <a:p/>
-          <a:p/>
-          <a:p>
-            <a:r>
-              <a:t>Amazon Elastic Block Store (Amazon EBS) is a service that provides block-level storage volumes that you can use with Amazon EC2 instances. If you stop or terminate an Amazon EC2 instance, all the data on the attached EBS volume remains available.</a:t>
+              <a:t>Amazon Elastic Block Store (EBS) provides block storage volumes for use with Amazon EC2 instances, preserving data on attached EBS volumes even if an EC2 instance is stopped or terminated.</a:t>
             </a:r>
           </a:p>
         </p:txBody>

</xml_diff>